<commit_message>
Add CahtApp, Device Compatablity Update
</commit_message>
<xml_diff>
--- a/Design Requirement/Chat/Chat - LetsDiscuss.pptx
+++ b/Design Requirement/Chat/Chat - LetsDiscuss.pptx
@@ -210,7 +210,7 @@
           <a:p>
             <a:fld id="{DB6CA646-4DB0-4081-BAF1-518ED8EEB214}" type="datetimeFigureOut">
               <a:rPr lang="en-IN" smtClean="0"/>
-              <a:t>14-06-2024</a:t>
+              <a:t>16-06-2024</a:t>
             </a:fld>
             <a:endParaRPr lang="en-IN" dirty="0"/>
           </a:p>
@@ -1683,7 +1683,7 @@
           <a:p>
             <a:fld id="{40BFCB34-1D3A-4E3D-AF01-87C69294AC55}" type="datetimeFigureOut">
               <a:rPr lang="en-IN" smtClean="0"/>
-              <a:t>14-06-2024</a:t>
+              <a:t>16-06-2024</a:t>
             </a:fld>
             <a:endParaRPr lang="en-IN" dirty="0"/>
           </a:p>
@@ -1883,7 +1883,7 @@
           <a:p>
             <a:fld id="{40BFCB34-1D3A-4E3D-AF01-87C69294AC55}" type="datetimeFigureOut">
               <a:rPr lang="en-IN" smtClean="0"/>
-              <a:t>14-06-2024</a:t>
+              <a:t>16-06-2024</a:t>
             </a:fld>
             <a:endParaRPr lang="en-IN" dirty="0"/>
           </a:p>
@@ -2093,7 +2093,7 @@
           <a:p>
             <a:fld id="{40BFCB34-1D3A-4E3D-AF01-87C69294AC55}" type="datetimeFigureOut">
               <a:rPr lang="en-IN" smtClean="0"/>
-              <a:t>14-06-2024</a:t>
+              <a:t>16-06-2024</a:t>
             </a:fld>
             <a:endParaRPr lang="en-IN" dirty="0"/>
           </a:p>
@@ -2206,7 +2206,7 @@
           <a:p>
             <a:fld id="{53685DBC-317F-4C6B-AEE2-0BEBDE6560A6}" type="datetimeFigureOut">
               <a:rPr lang="en-US" smtClean="0"/>
-              <a:t>6/14/2024</a:t>
+              <a:t>6/16/2024</a:t>
             </a:fld>
             <a:endParaRPr lang="en-US" dirty="0"/>
           </a:p>
@@ -2406,7 +2406,7 @@
           <a:p>
             <a:fld id="{40BFCB34-1D3A-4E3D-AF01-87C69294AC55}" type="datetimeFigureOut">
               <a:rPr lang="en-IN" smtClean="0"/>
-              <a:t>14-06-2024</a:t>
+              <a:t>16-06-2024</a:t>
             </a:fld>
             <a:endParaRPr lang="en-IN" dirty="0"/>
           </a:p>
@@ -2682,7 +2682,7 @@
           <a:p>
             <a:fld id="{40BFCB34-1D3A-4E3D-AF01-87C69294AC55}" type="datetimeFigureOut">
               <a:rPr lang="en-IN" smtClean="0"/>
-              <a:t>14-06-2024</a:t>
+              <a:t>16-06-2024</a:t>
             </a:fld>
             <a:endParaRPr lang="en-IN" dirty="0"/>
           </a:p>
@@ -2950,7 +2950,7 @@
           <a:p>
             <a:fld id="{40BFCB34-1D3A-4E3D-AF01-87C69294AC55}" type="datetimeFigureOut">
               <a:rPr lang="en-IN" smtClean="0"/>
-              <a:t>14-06-2024</a:t>
+              <a:t>16-06-2024</a:t>
             </a:fld>
             <a:endParaRPr lang="en-IN" dirty="0"/>
           </a:p>
@@ -3365,7 +3365,7 @@
           <a:p>
             <a:fld id="{40BFCB34-1D3A-4E3D-AF01-87C69294AC55}" type="datetimeFigureOut">
               <a:rPr lang="en-IN" smtClean="0"/>
-              <a:t>14-06-2024</a:t>
+              <a:t>16-06-2024</a:t>
             </a:fld>
             <a:endParaRPr lang="en-IN" dirty="0"/>
           </a:p>
@@ -3507,7 +3507,7 @@
           <a:p>
             <a:fld id="{40BFCB34-1D3A-4E3D-AF01-87C69294AC55}" type="datetimeFigureOut">
               <a:rPr lang="en-IN" smtClean="0"/>
-              <a:t>14-06-2024</a:t>
+              <a:t>16-06-2024</a:t>
             </a:fld>
             <a:endParaRPr lang="en-IN" dirty="0"/>
           </a:p>
@@ -3620,7 +3620,7 @@
           <a:p>
             <a:fld id="{40BFCB34-1D3A-4E3D-AF01-87C69294AC55}" type="datetimeFigureOut">
               <a:rPr lang="en-IN" smtClean="0"/>
-              <a:t>14-06-2024</a:t>
+              <a:t>16-06-2024</a:t>
             </a:fld>
             <a:endParaRPr lang="en-IN" dirty="0"/>
           </a:p>
@@ -3933,7 +3933,7 @@
           <a:p>
             <a:fld id="{40BFCB34-1D3A-4E3D-AF01-87C69294AC55}" type="datetimeFigureOut">
               <a:rPr lang="en-IN" smtClean="0"/>
-              <a:t>14-06-2024</a:t>
+              <a:t>16-06-2024</a:t>
             </a:fld>
             <a:endParaRPr lang="en-IN" dirty="0"/>
           </a:p>
@@ -4222,7 +4222,7 @@
           <a:p>
             <a:fld id="{40BFCB34-1D3A-4E3D-AF01-87C69294AC55}" type="datetimeFigureOut">
               <a:rPr lang="en-IN" smtClean="0"/>
-              <a:t>14-06-2024</a:t>
+              <a:t>16-06-2024</a:t>
             </a:fld>
             <a:endParaRPr lang="en-IN" dirty="0"/>
           </a:p>
@@ -4465,7 +4465,7 @@
           <a:p>
             <a:fld id="{40BFCB34-1D3A-4E3D-AF01-87C69294AC55}" type="datetimeFigureOut">
               <a:rPr lang="en-IN" smtClean="0"/>
-              <a:t>14-06-2024</a:t>
+              <a:t>16-06-2024</a:t>
             </a:fld>
             <a:endParaRPr lang="en-IN" dirty="0"/>
           </a:p>
@@ -5036,7 +5036,7 @@
           <a:p>
             <a:fld id="{53685DBC-317F-4C6B-AEE2-0BEBDE6560A6}" type="datetimeFigureOut">
               <a:rPr lang="en-US" smtClean="0"/>
-              <a:t>6/14/2024</a:t>
+              <a:t>6/16/2024</a:t>
             </a:fld>
             <a:endParaRPr lang="en-US" dirty="0"/>
           </a:p>
@@ -13063,7 +13063,7 @@
         <p:spPr>
           <a:xfrm>
             <a:off x="120320" y="0"/>
-            <a:ext cx="12071680" cy="4708981"/>
+            <a:ext cx="12071680" cy="4893647"/>
           </a:xfrm>
           <a:prstGeom prst="rect">
             <a:avLst/>
@@ -13118,28 +13118,39 @@
               <a:rPr lang="en-US" sz="1200" dirty="0">
                 <a:latin typeface="Avenir Next LT Pro" panose="020B0504020202020204" pitchFamily="34" charset="0"/>
               </a:rPr>
-              <a:t>Chats can be Schedule for the future (about a month ago) Update &amp; User Can see it only And can delete any Time before the time </a:t>
+              <a:t>Chats can be Schedule for the future (about a month ago) Update &amp; User Can see it only And can delete any Time before the time arrived.</a:t>
+            </a:r>
+          </a:p>
+          <a:p>
+            <a:pPr marL="228600" indent="-228600">
+              <a:buAutoNum type="arabicPeriod"/>
+            </a:pPr>
+            <a:r>
+              <a:rPr lang="en-US" sz="1200" dirty="0">
+                <a:latin typeface="Avenir Next LT Pro" panose="020B0504020202020204" pitchFamily="34" charset="0"/>
+              </a:rPr>
+              <a:t>Fixed msg : At the top center of every chat legal msg that these chats can be challenged in court</a:t>
+            </a:r>
+          </a:p>
+          <a:p>
+            <a:pPr marL="228600" indent="-228600">
+              <a:buAutoNum type="arabicPeriod"/>
+            </a:pPr>
+            <a:r>
+              <a:rPr lang="en-US" sz="1200" dirty="0">
+                <a:latin typeface="Avenir Next LT Pro" panose="020B0504020202020204" pitchFamily="34" charset="0"/>
+              </a:rPr>
+              <a:t>Status : Online or offline (Used Red &amp; green filled circles along with text – Filled Circle : Available, Non-filled Circle : </a:t>
             </a:r>
             <a:r>
               <a:rPr lang="en-US" sz="1200">
                 <a:latin typeface="Avenir Next LT Pro" panose="020B0504020202020204" pitchFamily="34" charset="0"/>
               </a:rPr>
-              <a:t>arrived.</a:t>
+              <a:t>Not available)</a:t>
             </a:r>
             <a:endParaRPr lang="en-US" sz="1200" dirty="0">
               <a:latin typeface="Avenir Next LT Pro" panose="020B0504020202020204" pitchFamily="34" charset="0"/>
             </a:endParaRPr>
-          </a:p>
-          <a:p>
-            <a:pPr marL="228600" indent="-228600">
-              <a:buAutoNum type="arabicPeriod"/>
-            </a:pPr>
-            <a:r>
-              <a:rPr lang="en-US" sz="1200" dirty="0">
-                <a:latin typeface="Avenir Next LT Pro" panose="020B0504020202020204" pitchFamily="34" charset="0"/>
-              </a:rPr>
-              <a:t>Fixed msg : At the top center of every chat legal msg that these chats can be challenged in court</a:t>
-            </a:r>
           </a:p>
           <a:p>
             <a:pPr marL="228600" indent="-228600">
@@ -16053,6 +16064,23 @@
 </file>
 
 <file path=customXml/item1.xml><?xml version="1.0" encoding="utf-8"?>
+<?mso-contentType ?>
+<FormTemplates xmlns="http://schemas.microsoft.com/sharepoint/v3/contenttype/forms">
+  <Display>DocumentLibraryForm</Display>
+  <Edit>DocumentLibraryForm</Edit>
+  <New>DocumentLibraryForm</New>
+</FormTemplates>
+</file>
+
+<file path=customXml/item2.xml><?xml version="1.0" encoding="utf-8"?>
+<p:properties xmlns:p="http://schemas.microsoft.com/office/2006/metadata/properties" xmlns:xsi="http://www.w3.org/2001/XMLSchema-instance" xmlns:pc="http://schemas.microsoft.com/office/infopath/2007/PartnerControls">
+  <documentManagement>
+    <_activity xmlns="0e1bb11d-1fe8-4e80-a80d-c671e8cd2a50" xsi:nil="true"/>
+  </documentManagement>
+</p:properties>
+</file>
+
+<file path=customXml/item3.xml><?xml version="1.0" encoding="utf-8"?>
 <ct:contentTypeSchema xmlns:ct="http://schemas.microsoft.com/office/2006/metadata/contentType" xmlns:ma="http://schemas.microsoft.com/office/2006/metadata/properties/metaAttributes" ct:_="" ma:_="" ma:contentTypeName="Document" ma:contentTypeID="0x010100A855378936633F46935DE081F3F0A723" ma:contentTypeVersion="14" ma:contentTypeDescription="Create a new document." ma:contentTypeScope="" ma:versionID="55f1e6ab26213e900d3ea6b73674690f">
   <xsd:schema xmlns:xsd="http://www.w3.org/2001/XMLSchema" xmlns:xs="http://www.w3.org/2001/XMLSchema" xmlns:p="http://schemas.microsoft.com/office/2006/metadata/properties" xmlns:ns3="0e1bb11d-1fe8-4e80-a80d-c671e8cd2a50" targetNamespace="http://schemas.microsoft.com/office/2006/metadata/properties" ma:root="true" ma:fieldsID="cb5bac23893b177075308ae0464414f8" ns3:_="">
     <xsd:import namespace="0e1bb11d-1fe8-4e80-a80d-c671e8cd2a50"/>
@@ -16260,37 +16288,10 @@
 </ct:contentTypeSchema>
 </file>
 
-<file path=customXml/item2.xml><?xml version="1.0" encoding="utf-8"?>
-<p:properties xmlns:p="http://schemas.microsoft.com/office/2006/metadata/properties" xmlns:xsi="http://www.w3.org/2001/XMLSchema-instance" xmlns:pc="http://schemas.microsoft.com/office/infopath/2007/PartnerControls">
-  <documentManagement>
-    <_activity xmlns="0e1bb11d-1fe8-4e80-a80d-c671e8cd2a50" xsi:nil="true"/>
-  </documentManagement>
-</p:properties>
-</file>
-
-<file path=customXml/item3.xml><?xml version="1.0" encoding="utf-8"?>
-<?mso-contentType ?>
-<FormTemplates xmlns="http://schemas.microsoft.com/sharepoint/v3/contenttype/forms">
-  <Display>DocumentLibraryForm</Display>
-  <Edit>DocumentLibraryForm</Edit>
-  <New>DocumentLibraryForm</New>
-</FormTemplates>
-</file>
-
 <file path=customXml/itemProps1.xml><?xml version="1.0" encoding="utf-8"?>
-<ds:datastoreItem xmlns:ds="http://schemas.openxmlformats.org/officeDocument/2006/customXml" ds:itemID="{7B2E56D0-A161-47EC-9D87-E508F7ED6741}">
+<ds:datastoreItem xmlns:ds="http://schemas.openxmlformats.org/officeDocument/2006/customXml" ds:itemID="{D9A29AA5-5937-490C-A495-D5C320512737}">
   <ds:schemaRefs>
-    <ds:schemaRef ds:uri="http://schemas.microsoft.com/office/2006/metadata/contentType"/>
-    <ds:schemaRef ds:uri="http://schemas.microsoft.com/office/2006/metadata/properties/metaAttributes"/>
-    <ds:schemaRef ds:uri="http://www.w3.org/2001/XMLSchema"/>
-    <ds:schemaRef ds:uri="http://schemas.microsoft.com/office/2006/metadata/properties"/>
-    <ds:schemaRef ds:uri="0e1bb11d-1fe8-4e80-a80d-c671e8cd2a50"/>
-    <ds:schemaRef ds:uri="http://schemas.microsoft.com/office/2006/documentManagement/types"/>
-    <ds:schemaRef ds:uri="http://schemas.microsoft.com/office/infopath/2007/PartnerControls"/>
-    <ds:schemaRef ds:uri="http://schemas.openxmlformats.org/package/2006/metadata/core-properties"/>
-    <ds:schemaRef ds:uri="http://purl.org/dc/elements/1.1/"/>
-    <ds:schemaRef ds:uri="http://purl.org/dc/terms/"/>
-    <ds:schemaRef ds:uri="http://schemas.microsoft.com/internal/obd"/>
+    <ds:schemaRef ds:uri="http://schemas.microsoft.com/sharepoint/v3/contenttype/forms"/>
   </ds:schemaRefs>
 </ds:datastoreItem>
 </file>
@@ -16312,9 +16313,19 @@
 </file>
 
 <file path=customXml/itemProps3.xml><?xml version="1.0" encoding="utf-8"?>
-<ds:datastoreItem xmlns:ds="http://schemas.openxmlformats.org/officeDocument/2006/customXml" ds:itemID="{D9A29AA5-5937-490C-A495-D5C320512737}">
+<ds:datastoreItem xmlns:ds="http://schemas.openxmlformats.org/officeDocument/2006/customXml" ds:itemID="{7B2E56D0-A161-47EC-9D87-E508F7ED6741}">
   <ds:schemaRefs>
-    <ds:schemaRef ds:uri="http://schemas.microsoft.com/sharepoint/v3/contenttype/forms"/>
+    <ds:schemaRef ds:uri="http://schemas.microsoft.com/office/2006/metadata/contentType"/>
+    <ds:schemaRef ds:uri="http://schemas.microsoft.com/office/2006/metadata/properties/metaAttributes"/>
+    <ds:schemaRef ds:uri="http://www.w3.org/2001/XMLSchema"/>
+    <ds:schemaRef ds:uri="http://schemas.microsoft.com/office/2006/metadata/properties"/>
+    <ds:schemaRef ds:uri="0e1bb11d-1fe8-4e80-a80d-c671e8cd2a50"/>
+    <ds:schemaRef ds:uri="http://schemas.microsoft.com/office/2006/documentManagement/types"/>
+    <ds:schemaRef ds:uri="http://schemas.microsoft.com/office/infopath/2007/PartnerControls"/>
+    <ds:schemaRef ds:uri="http://schemas.openxmlformats.org/package/2006/metadata/core-properties"/>
+    <ds:schemaRef ds:uri="http://purl.org/dc/elements/1.1/"/>
+    <ds:schemaRef ds:uri="http://purl.org/dc/terms/"/>
+    <ds:schemaRef ds:uri="http://schemas.microsoft.com/internal/obd"/>
   </ds:schemaRefs>
 </ds:datastoreItem>
 </file>
</xml_diff>

<commit_message>
Add Chats data, Update ChatBox
</commit_message>
<xml_diff>
--- a/Design Requirement/Chat/Chat - LetsDiscuss.pptx
+++ b/Design Requirement/Chat/Chat - LetsDiscuss.pptx
@@ -13063,7 +13063,7 @@
         <p:spPr>
           <a:xfrm>
             <a:off x="120320" y="0"/>
-            <a:ext cx="12071680" cy="4893647"/>
+            <a:ext cx="12071680" cy="5262979"/>
           </a:xfrm>
           <a:prstGeom prst="rect">
             <a:avLst/>
@@ -13140,13 +13140,47 @@
               <a:rPr lang="en-US" sz="1200" dirty="0">
                 <a:latin typeface="Avenir Next LT Pro" panose="020B0504020202020204" pitchFamily="34" charset="0"/>
               </a:rPr>
-              <a:t>Status : Online or offline (Used Red &amp; green filled circles along with text – Filled Circle : Available, Non-filled Circle : </a:t>
+              <a:t>Status : Online or offline (Used Red &amp; green filled circles along with text – Filled Circle : Available, Non-filled Circle : Not available)</a:t>
+            </a:r>
+          </a:p>
+          <a:p>
+            <a:pPr marL="228600" indent="-228600">
+              <a:buAutoNum type="arabicPeriod"/>
+            </a:pPr>
+            <a:r>
+              <a:rPr lang="en-US" sz="1200" dirty="0">
+                <a:latin typeface="Avenir Next LT Pro" panose="020B0504020202020204" pitchFamily="34" charset="0"/>
+              </a:rPr>
+              <a:t>Share Button : On Click if Expand and ask for option [copy msg, copy card, forward msg, select]</a:t>
+            </a:r>
+          </a:p>
+          <a:p>
+            <a:pPr marL="228600" indent="-228600">
+              <a:buAutoNum type="arabicPeriod"/>
+            </a:pPr>
+            <a:r>
+              <a:rPr lang="en-US" sz="1200" dirty="0">
+                <a:latin typeface="Avenir Next LT Pro" panose="020B0504020202020204" pitchFamily="34" charset="0"/>
+              </a:rPr>
+              <a:t>Taps : Double tap to forward msg, tap &amp; hold for select, triple tab to </a:t>
             </a:r>
             <a:r>
               <a:rPr lang="en-US" sz="1200">
                 <a:latin typeface="Avenir Next LT Pro" panose="020B0504020202020204" pitchFamily="34" charset="0"/>
               </a:rPr>
-              <a:t>Not available)</a:t>
+              <a:t>Show Option </a:t>
+            </a:r>
+            <a:r>
+              <a:rPr lang="en-US" sz="1200" dirty="0">
+                <a:latin typeface="Avenir Next LT Pro" panose="020B0504020202020204" pitchFamily="34" charset="0"/>
+              </a:rPr>
+              <a:t>to save msg as </a:t>
+            </a:r>
+            <a:r>
+              <a:rPr lang="en-US" sz="1200">
+                <a:latin typeface="Avenir Next LT Pro" panose="020B0504020202020204" pitchFamily="34" charset="0"/>
+              </a:rPr>
+              <a:t>a card</a:t>
             </a:r>
             <a:endParaRPr lang="en-US" sz="1200" dirty="0">
               <a:latin typeface="Avenir Next LT Pro" panose="020B0504020202020204" pitchFamily="34" charset="0"/>
@@ -16064,23 +16098,6 @@
 </file>
 
 <file path=customXml/item1.xml><?xml version="1.0" encoding="utf-8"?>
-<?mso-contentType ?>
-<FormTemplates xmlns="http://schemas.microsoft.com/sharepoint/v3/contenttype/forms">
-  <Display>DocumentLibraryForm</Display>
-  <Edit>DocumentLibraryForm</Edit>
-  <New>DocumentLibraryForm</New>
-</FormTemplates>
-</file>
-
-<file path=customXml/item2.xml><?xml version="1.0" encoding="utf-8"?>
-<p:properties xmlns:p="http://schemas.microsoft.com/office/2006/metadata/properties" xmlns:xsi="http://www.w3.org/2001/XMLSchema-instance" xmlns:pc="http://schemas.microsoft.com/office/infopath/2007/PartnerControls">
-  <documentManagement>
-    <_activity xmlns="0e1bb11d-1fe8-4e80-a80d-c671e8cd2a50" xsi:nil="true"/>
-  </documentManagement>
-</p:properties>
-</file>
-
-<file path=customXml/item3.xml><?xml version="1.0" encoding="utf-8"?>
 <ct:contentTypeSchema xmlns:ct="http://schemas.microsoft.com/office/2006/metadata/contentType" xmlns:ma="http://schemas.microsoft.com/office/2006/metadata/properties/metaAttributes" ct:_="" ma:_="" ma:contentTypeName="Document" ma:contentTypeID="0x010100A855378936633F46935DE081F3F0A723" ma:contentTypeVersion="14" ma:contentTypeDescription="Create a new document." ma:contentTypeScope="" ma:versionID="55f1e6ab26213e900d3ea6b73674690f">
   <xsd:schema xmlns:xsd="http://www.w3.org/2001/XMLSchema" xmlns:xs="http://www.w3.org/2001/XMLSchema" xmlns:p="http://schemas.microsoft.com/office/2006/metadata/properties" xmlns:ns3="0e1bb11d-1fe8-4e80-a80d-c671e8cd2a50" targetNamespace="http://schemas.microsoft.com/office/2006/metadata/properties" ma:root="true" ma:fieldsID="cb5bac23893b177075308ae0464414f8" ns3:_="">
     <xsd:import namespace="0e1bb11d-1fe8-4e80-a80d-c671e8cd2a50"/>
@@ -16288,10 +16305,37 @@
 </ct:contentTypeSchema>
 </file>
 
+<file path=customXml/item2.xml><?xml version="1.0" encoding="utf-8"?>
+<p:properties xmlns:p="http://schemas.microsoft.com/office/2006/metadata/properties" xmlns:xsi="http://www.w3.org/2001/XMLSchema-instance" xmlns:pc="http://schemas.microsoft.com/office/infopath/2007/PartnerControls">
+  <documentManagement>
+    <_activity xmlns="0e1bb11d-1fe8-4e80-a80d-c671e8cd2a50" xsi:nil="true"/>
+  </documentManagement>
+</p:properties>
+</file>
+
+<file path=customXml/item3.xml><?xml version="1.0" encoding="utf-8"?>
+<?mso-contentType ?>
+<FormTemplates xmlns="http://schemas.microsoft.com/sharepoint/v3/contenttype/forms">
+  <Display>DocumentLibraryForm</Display>
+  <Edit>DocumentLibraryForm</Edit>
+  <New>DocumentLibraryForm</New>
+</FormTemplates>
+</file>
+
 <file path=customXml/itemProps1.xml><?xml version="1.0" encoding="utf-8"?>
-<ds:datastoreItem xmlns:ds="http://schemas.openxmlformats.org/officeDocument/2006/customXml" ds:itemID="{D9A29AA5-5937-490C-A495-D5C320512737}">
+<ds:datastoreItem xmlns:ds="http://schemas.openxmlformats.org/officeDocument/2006/customXml" ds:itemID="{7B2E56D0-A161-47EC-9D87-E508F7ED6741}">
   <ds:schemaRefs>
-    <ds:schemaRef ds:uri="http://schemas.microsoft.com/sharepoint/v3/contenttype/forms"/>
+    <ds:schemaRef ds:uri="http://schemas.microsoft.com/office/2006/metadata/contentType"/>
+    <ds:schemaRef ds:uri="http://schemas.microsoft.com/office/2006/metadata/properties/metaAttributes"/>
+    <ds:schemaRef ds:uri="http://www.w3.org/2001/XMLSchema"/>
+    <ds:schemaRef ds:uri="http://schemas.microsoft.com/office/2006/metadata/properties"/>
+    <ds:schemaRef ds:uri="0e1bb11d-1fe8-4e80-a80d-c671e8cd2a50"/>
+    <ds:schemaRef ds:uri="http://schemas.microsoft.com/office/2006/documentManagement/types"/>
+    <ds:schemaRef ds:uri="http://schemas.microsoft.com/office/infopath/2007/PartnerControls"/>
+    <ds:schemaRef ds:uri="http://schemas.openxmlformats.org/package/2006/metadata/core-properties"/>
+    <ds:schemaRef ds:uri="http://purl.org/dc/elements/1.1/"/>
+    <ds:schemaRef ds:uri="http://purl.org/dc/terms/"/>
+    <ds:schemaRef ds:uri="http://schemas.microsoft.com/internal/obd"/>
   </ds:schemaRefs>
 </ds:datastoreItem>
 </file>
@@ -16313,19 +16357,9 @@
 </file>
 
 <file path=customXml/itemProps3.xml><?xml version="1.0" encoding="utf-8"?>
-<ds:datastoreItem xmlns:ds="http://schemas.openxmlformats.org/officeDocument/2006/customXml" ds:itemID="{7B2E56D0-A161-47EC-9D87-E508F7ED6741}">
+<ds:datastoreItem xmlns:ds="http://schemas.openxmlformats.org/officeDocument/2006/customXml" ds:itemID="{D9A29AA5-5937-490C-A495-D5C320512737}">
   <ds:schemaRefs>
-    <ds:schemaRef ds:uri="http://schemas.microsoft.com/office/2006/metadata/contentType"/>
-    <ds:schemaRef ds:uri="http://schemas.microsoft.com/office/2006/metadata/properties/metaAttributes"/>
-    <ds:schemaRef ds:uri="http://www.w3.org/2001/XMLSchema"/>
-    <ds:schemaRef ds:uri="http://schemas.microsoft.com/office/2006/metadata/properties"/>
-    <ds:schemaRef ds:uri="0e1bb11d-1fe8-4e80-a80d-c671e8cd2a50"/>
-    <ds:schemaRef ds:uri="http://schemas.microsoft.com/office/2006/documentManagement/types"/>
-    <ds:schemaRef ds:uri="http://schemas.microsoft.com/office/infopath/2007/PartnerControls"/>
-    <ds:schemaRef ds:uri="http://schemas.openxmlformats.org/package/2006/metadata/core-properties"/>
-    <ds:schemaRef ds:uri="http://purl.org/dc/elements/1.1/"/>
-    <ds:schemaRef ds:uri="http://purl.org/dc/terms/"/>
-    <ds:schemaRef ds:uri="http://schemas.microsoft.com/internal/obd"/>
+    <ds:schemaRef ds:uri="http://schemas.microsoft.com/sharepoint/v3/contenttype/forms"/>
   </ds:schemaRefs>
 </ds:datastoreItem>
 </file>
</xml_diff>